<commit_message>
Update Readme.md in this repository
</commit_message>
<xml_diff>
--- a/Report/洪瑶_1801111621并行程序设计报告.pptx
+++ b/Report/洪瑶_1801111621并行程序设计报告.pptx
@@ -200,7 +200,7 @@
               <a:cs typeface="+mn-cs"/>
             </a:defRPr>
           </a:pPr>
-          <a:endParaRPr lang="en-US"/>
+          <a:endParaRPr lang="zh-CN"/>
         </a:p>
       </c:txPr>
     </c:title>
@@ -286,7 +286,7 @@
                     <a:cs typeface="+mn-cs"/>
                   </a:defRPr>
                 </a:pPr>
-                <a:endParaRPr lang="en-US"/>
+                <a:endParaRPr lang="zh-CN"/>
               </a:p>
             </c:txPr>
             <c:dLblPos val="outEnd"/>
@@ -450,7 +450,7 @@
                     <a:cs typeface="+mn-cs"/>
                   </a:defRPr>
                 </a:pPr>
-                <a:endParaRPr lang="en-US"/>
+                <a:endParaRPr lang="zh-CN"/>
               </a:p>
             </c:txPr>
             <c:dLblPos val="outEnd"/>
@@ -605,7 +605,7 @@
                   <a:cs typeface="+mn-cs"/>
                 </a:defRPr>
               </a:pPr>
-              <a:endParaRPr lang="en-US"/>
+              <a:endParaRPr lang="zh-CN"/>
             </a:p>
           </c:txPr>
         </c:title>
@@ -640,7 +640,7 @@
                 <a:cs typeface="+mn-cs"/>
               </a:defRPr>
             </a:pPr>
-            <a:endParaRPr lang="en-US"/>
+            <a:endParaRPr lang="zh-CN"/>
           </a:p>
         </c:txPr>
         <c:crossAx val="724372400"/>
@@ -696,7 +696,7 @@
                 <a:cs typeface="+mn-cs"/>
               </a:defRPr>
             </a:pPr>
-            <a:endParaRPr lang="en-US"/>
+            <a:endParaRPr lang="zh-CN"/>
           </a:p>
         </c:txPr>
         <c:crossAx val="760894512"/>
@@ -729,7 +729,7 @@
                 <a:cs typeface="+mn-cs"/>
               </a:defRPr>
             </a:pPr>
-            <a:endParaRPr lang="en-US"/>
+            <a:endParaRPr lang="zh-CN"/>
           </a:p>
         </c:txPr>
       </c:legendEntry>
@@ -749,7 +749,7 @@
                 <a:cs typeface="+mn-cs"/>
               </a:defRPr>
             </a:pPr>
-            <a:endParaRPr lang="en-US"/>
+            <a:endParaRPr lang="zh-CN"/>
           </a:p>
         </c:txPr>
       </c:legendEntry>
@@ -775,7 +775,7 @@
               <a:cs typeface="+mn-cs"/>
             </a:defRPr>
           </a:pPr>
-          <a:endParaRPr lang="en-US"/>
+          <a:endParaRPr lang="zh-CN"/>
         </a:p>
       </c:txPr>
     </c:legend>
@@ -806,7 +806,7 @@
       <a:pPr>
         <a:defRPr/>
       </a:pPr>
-      <a:endParaRPr lang="en-US"/>
+      <a:endParaRPr lang="zh-CN"/>
     </a:p>
   </c:txPr>
   <c:externalData r:id="rId3">
@@ -890,7 +890,7 @@
               <a:cs typeface="Times New Roman" panose="02020603050405020304" pitchFamily="18" charset="0"/>
             </a:defRPr>
           </a:pPr>
-          <a:endParaRPr lang="en-US"/>
+          <a:endParaRPr lang="zh-CN"/>
         </a:p>
       </c:txPr>
     </c:title>
@@ -955,7 +955,7 @@
                     <a:cs typeface="+mn-cs"/>
                   </a:defRPr>
                 </a:pPr>
-                <a:endParaRPr lang="en-US"/>
+                <a:endParaRPr lang="zh-CN"/>
               </a:p>
             </c:txPr>
             <c:dLblPos val="outEnd"/>
@@ -1103,7 +1103,7 @@
                     <a:cs typeface="+mn-cs"/>
                   </a:defRPr>
                 </a:pPr>
-                <a:endParaRPr lang="en-US"/>
+                <a:endParaRPr lang="zh-CN"/>
               </a:p>
             </c:txPr>
             <c:dLblPos val="outEnd"/>
@@ -1274,7 +1274,7 @@
                   <a:cs typeface="+mn-cs"/>
                 </a:defRPr>
               </a:pPr>
-              <a:endParaRPr lang="en-US"/>
+              <a:endParaRPr lang="zh-CN"/>
             </a:p>
           </c:txPr>
         </c:title>
@@ -1312,7 +1312,7 @@
                 <a:cs typeface="+mn-cs"/>
               </a:defRPr>
             </a:pPr>
-            <a:endParaRPr lang="en-US"/>
+            <a:endParaRPr lang="zh-CN"/>
           </a:p>
         </c:txPr>
         <c:crossAx val="892592056"/>
@@ -1368,7 +1368,7 @@
                 <a:cs typeface="+mn-cs"/>
               </a:defRPr>
             </a:pPr>
-            <a:endParaRPr lang="en-US"/>
+            <a:endParaRPr lang="zh-CN"/>
           </a:p>
         </c:txPr>
         <c:crossAx val="892591736"/>
@@ -1420,7 +1420,7 @@
               <a:cs typeface="+mn-cs"/>
             </a:defRPr>
           </a:pPr>
-          <a:endParaRPr lang="en-US"/>
+          <a:endParaRPr lang="zh-CN"/>
         </a:p>
       </c:txPr>
     </c:legend>
@@ -1451,7 +1451,7 @@
       <a:pPr>
         <a:defRPr/>
       </a:pPr>
-      <a:endParaRPr lang="en-US"/>
+      <a:endParaRPr lang="zh-CN"/>
     </a:p>
   </c:txPr>
   <c:externalData r:id="rId3">
@@ -1541,7 +1541,7 @@
               <a:cs typeface="+mn-cs"/>
             </a:defRPr>
           </a:pPr>
-          <a:endParaRPr lang="en-US"/>
+          <a:endParaRPr lang="zh-CN"/>
         </a:p>
       </c:txPr>
     </c:title>
@@ -1604,7 +1604,7 @@
                     <a:cs typeface="+mn-cs"/>
                   </a:defRPr>
                 </a:pPr>
-                <a:endParaRPr lang="en-US"/>
+                <a:endParaRPr lang="zh-CN"/>
               </a:p>
             </c:txPr>
             <c:dLblPos val="outEnd"/>
@@ -1740,7 +1740,7 @@
                     <a:cs typeface="+mn-cs"/>
                   </a:defRPr>
                 </a:pPr>
-                <a:endParaRPr lang="en-US"/>
+                <a:endParaRPr lang="zh-CN"/>
               </a:p>
             </c:txPr>
             <c:dLblPos val="outEnd"/>
@@ -1899,7 +1899,7 @@
                   <a:cs typeface="+mn-cs"/>
                 </a:defRPr>
               </a:pPr>
-              <a:endParaRPr lang="en-US"/>
+              <a:endParaRPr lang="zh-CN"/>
             </a:p>
           </c:txPr>
         </c:title>
@@ -1937,7 +1937,7 @@
                 <a:cs typeface="+mn-cs"/>
               </a:defRPr>
             </a:pPr>
-            <a:endParaRPr lang="en-US"/>
+            <a:endParaRPr lang="zh-CN"/>
           </a:p>
         </c:txPr>
         <c:crossAx val="724372400"/>
@@ -1996,7 +1996,7 @@
                 <a:cs typeface="+mn-cs"/>
               </a:defRPr>
             </a:pPr>
-            <a:endParaRPr lang="en-US"/>
+            <a:endParaRPr lang="zh-CN"/>
           </a:p>
         </c:txPr>
         <c:crossAx val="760894512"/>
@@ -2032,7 +2032,7 @@
                 <a:cs typeface="Times New Roman" panose="02020603050405020304" pitchFamily="18" charset="0"/>
               </a:defRPr>
             </a:pPr>
-            <a:endParaRPr lang="en-US"/>
+            <a:endParaRPr lang="zh-CN"/>
           </a:p>
         </c:txPr>
       </c:legendEntry>
@@ -2055,7 +2055,7 @@
                 <a:cs typeface="Times New Roman" panose="02020603050405020304" pitchFamily="18" charset="0"/>
               </a:defRPr>
             </a:pPr>
-            <a:endParaRPr lang="en-US"/>
+            <a:endParaRPr lang="zh-CN"/>
           </a:p>
         </c:txPr>
       </c:legendEntry>
@@ -2084,7 +2084,7 @@
               <a:cs typeface="+mn-cs"/>
             </a:defRPr>
           </a:pPr>
-          <a:endParaRPr lang="en-US"/>
+          <a:endParaRPr lang="zh-CN"/>
         </a:p>
       </c:txPr>
     </c:legend>
@@ -2115,7 +2115,7 @@
       <a:pPr>
         <a:defRPr/>
       </a:pPr>
-      <a:endParaRPr lang="en-US"/>
+      <a:endParaRPr lang="zh-CN"/>
     </a:p>
   </c:txPr>
   <c:externalData r:id="rId3">
@@ -2199,7 +2199,7 @@
               <a:cs typeface="Times New Roman" panose="02020603050405020304" pitchFamily="18" charset="0"/>
             </a:defRPr>
           </a:pPr>
-          <a:endParaRPr lang="en-US"/>
+          <a:endParaRPr lang="zh-CN"/>
         </a:p>
       </c:txPr>
     </c:title>
@@ -2264,7 +2264,7 @@
                     <a:cs typeface="+mn-cs"/>
                   </a:defRPr>
                 </a:pPr>
-                <a:endParaRPr lang="en-US"/>
+                <a:endParaRPr lang="zh-CN"/>
               </a:p>
             </c:txPr>
             <c:dLblPos val="outEnd"/>
@@ -2406,7 +2406,7 @@
                     <a:cs typeface="+mn-cs"/>
                   </a:defRPr>
                 </a:pPr>
-                <a:endParaRPr lang="en-US"/>
+                <a:endParaRPr lang="zh-CN"/>
               </a:p>
             </c:txPr>
             <c:dLblPos val="outEnd"/>
@@ -2571,7 +2571,7 @@
                   <a:cs typeface="+mn-cs"/>
                 </a:defRPr>
               </a:pPr>
-              <a:endParaRPr lang="en-US"/>
+              <a:endParaRPr lang="zh-CN"/>
             </a:p>
           </c:txPr>
         </c:title>
@@ -2609,7 +2609,7 @@
                 <a:cs typeface="+mn-cs"/>
               </a:defRPr>
             </a:pPr>
-            <a:endParaRPr lang="en-US"/>
+            <a:endParaRPr lang="zh-CN"/>
           </a:p>
         </c:txPr>
         <c:crossAx val="892592056"/>
@@ -2668,7 +2668,7 @@
                 <a:cs typeface="+mn-cs"/>
               </a:defRPr>
             </a:pPr>
-            <a:endParaRPr lang="en-US"/>
+            <a:endParaRPr lang="zh-CN"/>
           </a:p>
         </c:txPr>
         <c:crossAx val="892591736"/>
@@ -2720,7 +2720,7 @@
               <a:cs typeface="+mn-cs"/>
             </a:defRPr>
           </a:pPr>
-          <a:endParaRPr lang="en-US"/>
+          <a:endParaRPr lang="zh-CN"/>
         </a:p>
       </c:txPr>
     </c:legend>
@@ -2751,7 +2751,7 @@
       <a:pPr>
         <a:defRPr/>
       </a:pPr>
-      <a:endParaRPr lang="en-US"/>
+      <a:endParaRPr lang="zh-CN"/>
     </a:p>
   </c:txPr>
   <c:externalData r:id="rId3">
@@ -5023,7 +5023,7 @@
           <a:p>
             <a:fld id="{A0BEA5B3-B795-4435-A853-71C7049EF69B}" type="datetimeFigureOut">
               <a:rPr lang="zh-CN" altLang="en-US" smtClean="0"/>
-              <a:t>2018/12/25</a:t>
+              <a:t>2019/1/2</a:t>
             </a:fld>
             <a:endParaRPr lang="zh-CN" altLang="en-US"/>
           </a:p>
@@ -5193,7 +5193,7 @@
           <a:p>
             <a:fld id="{A0BEA5B3-B795-4435-A853-71C7049EF69B}" type="datetimeFigureOut">
               <a:rPr lang="zh-CN" altLang="en-US" smtClean="0"/>
-              <a:t>2018/12/25</a:t>
+              <a:t>2019/1/2</a:t>
             </a:fld>
             <a:endParaRPr lang="zh-CN" altLang="en-US"/>
           </a:p>
@@ -5373,7 +5373,7 @@
           <a:p>
             <a:fld id="{A0BEA5B3-B795-4435-A853-71C7049EF69B}" type="datetimeFigureOut">
               <a:rPr lang="zh-CN" altLang="en-US" smtClean="0"/>
-              <a:t>2018/12/25</a:t>
+              <a:t>2019/1/2</a:t>
             </a:fld>
             <a:endParaRPr lang="zh-CN" altLang="en-US"/>
           </a:p>
@@ -7620,7 +7620,7 @@
           <a:p>
             <a:fld id="{A0BEA5B3-B795-4435-A853-71C7049EF69B}" type="datetimeFigureOut">
               <a:rPr lang="zh-CN" altLang="en-US" smtClean="0"/>
-              <a:t>2018/12/25</a:t>
+              <a:t>2019/1/2</a:t>
             </a:fld>
             <a:endParaRPr lang="zh-CN" altLang="en-US"/>
           </a:p>
@@ -8630,7 +8630,7 @@
           <a:p>
             <a:fld id="{A0BEA5B3-B795-4435-A853-71C7049EF69B}" type="datetimeFigureOut">
               <a:rPr lang="zh-CN" altLang="en-US" smtClean="0"/>
-              <a:t>2018/12/25</a:t>
+              <a:t>2019/1/2</a:t>
             </a:fld>
             <a:endParaRPr lang="zh-CN" altLang="en-US"/>
           </a:p>
@@ -8862,7 +8862,7 @@
           <a:p>
             <a:fld id="{A0BEA5B3-B795-4435-A853-71C7049EF69B}" type="datetimeFigureOut">
               <a:rPr lang="zh-CN" altLang="en-US" smtClean="0"/>
-              <a:t>2018/12/25</a:t>
+              <a:t>2019/1/2</a:t>
             </a:fld>
             <a:endParaRPr lang="zh-CN" altLang="en-US"/>
           </a:p>
@@ -9229,7 +9229,7 @@
           <a:p>
             <a:fld id="{A0BEA5B3-B795-4435-A853-71C7049EF69B}" type="datetimeFigureOut">
               <a:rPr lang="zh-CN" altLang="en-US" smtClean="0"/>
-              <a:t>2018/12/25</a:t>
+              <a:t>2019/1/2</a:t>
             </a:fld>
             <a:endParaRPr lang="zh-CN" altLang="en-US"/>
           </a:p>
@@ -9347,7 +9347,7 @@
           <a:p>
             <a:fld id="{A0BEA5B3-B795-4435-A853-71C7049EF69B}" type="datetimeFigureOut">
               <a:rPr lang="zh-CN" altLang="en-US" smtClean="0"/>
-              <a:t>2018/12/25</a:t>
+              <a:t>2019/1/2</a:t>
             </a:fld>
             <a:endParaRPr lang="zh-CN" altLang="en-US"/>
           </a:p>
@@ -9442,7 +9442,7 @@
           <a:p>
             <a:fld id="{A0BEA5B3-B795-4435-A853-71C7049EF69B}" type="datetimeFigureOut">
               <a:rPr lang="zh-CN" altLang="en-US" smtClean="0"/>
-              <a:t>2018/12/25</a:t>
+              <a:t>2019/1/2</a:t>
             </a:fld>
             <a:endParaRPr lang="zh-CN" altLang="en-US"/>
           </a:p>
@@ -9719,7 +9719,7 @@
           <a:p>
             <a:fld id="{A0BEA5B3-B795-4435-A853-71C7049EF69B}" type="datetimeFigureOut">
               <a:rPr lang="zh-CN" altLang="en-US" smtClean="0"/>
-              <a:t>2018/12/25</a:t>
+              <a:t>2019/1/2</a:t>
             </a:fld>
             <a:endParaRPr lang="zh-CN" altLang="en-US"/>
           </a:p>
@@ -9976,7 +9976,7 @@
           <a:p>
             <a:fld id="{A0BEA5B3-B795-4435-A853-71C7049EF69B}" type="datetimeFigureOut">
               <a:rPr lang="zh-CN" altLang="en-US" smtClean="0"/>
-              <a:t>2018/12/25</a:t>
+              <a:t>2019/1/2</a:t>
             </a:fld>
             <a:endParaRPr lang="zh-CN" altLang="en-US"/>
           </a:p>
@@ -10189,7 +10189,7 @@
           <a:p>
             <a:fld id="{A0BEA5B3-B795-4435-A853-71C7049EF69B}" type="datetimeFigureOut">
               <a:rPr lang="zh-CN" altLang="en-US" smtClean="0"/>
-              <a:t>2018/12/25</a:t>
+              <a:t>2019/1/2</a:t>
             </a:fld>
             <a:endParaRPr lang="zh-CN" altLang="en-US"/>
           </a:p>
@@ -11613,7 +11613,7 @@
           <a:p>
             <a:r>
               <a:rPr lang="zh-CN" altLang="en-US" sz="3200" dirty="0"/>
-              <a:t>洪瑶</a:t>
+              <a:t>洪垚</a:t>
             </a:r>
           </a:p>
         </p:txBody>
@@ -26616,7 +26616,7 @@
           <a:graphicData uri="http://schemas.openxmlformats.org/presentationml/2006/ole">
             <mc:AlternateContent xmlns:mc="http://schemas.openxmlformats.org/markup-compatibility/2006">
               <mc:Choice xmlns:v="urn:schemas-microsoft-com:vml" Requires="v">
-                <p:oleObj spid="_x0000_s1031" name="Equation" r:id="rId4" imgW="3136900" imgH="495300" progId="Equation.DSMT4">
+                <p:oleObj spid="_x0000_s1032" name="Equation" r:id="rId4" imgW="3136900" imgH="495300" progId="Equation.DSMT4">
                   <p:embed/>
                 </p:oleObj>
               </mc:Choice>
@@ -31174,8 +31174,8 @@
           </a:ln>
         </p:spPr>
       </p:pic>
-      <mc:AlternateContent xmlns:mc="http://schemas.openxmlformats.org/markup-compatibility/2006">
-        <mc:Choice xmlns:a14="http://schemas.microsoft.com/office/drawing/2010/main" Requires="a14">
+      <mc:AlternateContent xmlns:mc="http://schemas.openxmlformats.org/markup-compatibility/2006" xmlns:a14="http://schemas.microsoft.com/office/drawing/2010/main">
+        <mc:Choice Requires="a14">
           <p:sp>
             <p:nvSpPr>
               <p:cNvPr id="35" name="Rectangle 9">
@@ -31300,8 +31300,8 @@
                       <m:f>
                         <m:fPr>
                           <m:ctrlPr>
-                            <a:rPr lang="en-US" sz="2000">
-                              <a:latin typeface="+mn-ea"/>
+                            <a:rPr lang="en-US" sz="2000" i="1">
+                              <a:latin typeface="Cambria Math" panose="02040503050406030204" pitchFamily="18" charset="0"/>
                             </a:rPr>
                           </m:ctrlPr>
                         </m:fPr>
@@ -31337,8 +31337,8 @@
                       <m:f>
                         <m:fPr>
                           <m:ctrlPr>
-                            <a:rPr lang="en-US" sz="2000">
-                              <a:latin typeface="+mn-ea"/>
+                            <a:rPr lang="en-US" sz="2000" i="1">
+                              <a:latin typeface="Cambria Math" panose="02040503050406030204" pitchFamily="18" charset="0"/>
                             </a:rPr>
                           </m:ctrlPr>
                         </m:fPr>
@@ -31375,7 +31375,7 @@
             </p:txBody>
           </p:sp>
         </mc:Choice>
-        <mc:Fallback>
+        <mc:Fallback xmlns="">
           <p:sp>
             <p:nvSpPr>
               <p:cNvPr id="35" name="Rectangle 9">

</xml_diff>